<commit_message>
Fixed some spelling and wording. Rearranged hardware section to fit style.
</commit_message>
<xml_diff>
--- a/Documents/ExpoPoster/poster_undergrad_expo_48x36_eecs.pptx
+++ b/Documents/ExpoPoster/poster_undergrad_expo_48x36_eecs.pptx
@@ -243,7 +243,7 @@
             <a:fld id="{9CF59EBC-EC05-6B4D-B166-DDFA6A1EDCB6}" type="datetimeFigureOut">
               <a:rPr lang="en-US" smtClean="0"/>
               <a:pPr/>
-              <a:t>2/13/2018</a:t>
+              <a:t>4/17/2018</a:t>
             </a:fld>
             <a:endParaRPr lang="en-US" dirty="0"/>
           </a:p>
@@ -2987,7 +2987,7 @@
                 <a:ea typeface="Verdana" charset="0"/>
                 <a:cs typeface="Verdana" charset="0"/>
               </a:rPr>
-              <a:t>To fix this problem many growers have started small indoor grow systems. This allows them to have more consistent lighting, while also keeping the plants out of the cold.</a:t>
+              <a:t>To fix this problem, many growers have started small indoor grow systems. This allows them to have more consistent lighting, while also keeping the plants out of the cold.</a:t>
             </a:r>
           </a:p>
           <a:p>
@@ -3271,7 +3271,7 @@
                 <a:ea typeface="Georgia" charset="0"/>
                 <a:cs typeface="Georgia" charset="0"/>
               </a:rPr>
-              <a:t>PlanteRGB</a:t>
+              <a:t>PlanteR</a:t>
             </a:r>
             <a:r>
               <a:rPr lang="en-US" dirty="0">
@@ -3279,7 +3279,7 @@
                 <a:ea typeface="Georgia" charset="0"/>
                 <a:cs typeface="Georgia" charset="0"/>
               </a:rPr>
-              <a:t>: An RGB light system for indoor plant growth.</a:t>
+              <a:t>-GB: An RGB lighting system for indoor plant growth.</a:t>
             </a:r>
           </a:p>
         </p:txBody>
@@ -3492,8 +3492,8 @@
         </p:nvSpPr>
         <p:spPr>
           <a:xfrm>
-            <a:off x="33966678" y="14654474"/>
-            <a:ext cx="8126412" cy="13029208"/>
+            <a:off x="33252728" y="14654474"/>
+            <a:ext cx="8840362" cy="14798923"/>
           </a:xfrm>
           <a:prstGeom prst="rect">
             <a:avLst/>
@@ -3710,7 +3710,7 @@
               <a:rPr lang="en-US" sz="3200" dirty="0">
                 <a:latin typeface="Verdana Regular" charset="0"/>
               </a:rPr>
-              <a:t>A Raspberry pi Zero W is being used to control.</a:t>
+              <a:t>A Raspberry pi Zero W is being used to host everything else.</a:t>
             </a:r>
           </a:p>
           <a:p>
@@ -3749,7 +3749,7 @@
               <a:rPr lang="en-US" sz="3200" dirty="0">
                 <a:latin typeface="Verdana Regular" charset="0"/>
               </a:rPr>
-              <a:t>User Interface: Python script/Web page for interacting with the system</a:t>
+              <a:t>User Interface: Python script/Nodejs based web page for interacting with the system</a:t>
             </a:r>
           </a:p>
           <a:p>
@@ -3788,24 +3788,77 @@
               <a:rPr lang="en-US" sz="3200" dirty="0">
                 <a:latin typeface="Verdana Regular" charset="0"/>
               </a:rPr>
-              <a:t>Hardware: Physical components that reflect the state given by the</a:t>
-            </a:r>
-          </a:p>
-          <a:p>
-            <a:pPr marL="0" indent="0" algn="just">
+              <a:t>Hardware: Physical components that reflect the state given by the system</a:t>
+            </a:r>
+          </a:p>
+          <a:p>
+            <a:pPr marL="0" indent="0">
               <a:spcAft>
                 <a:spcPts val="2600"/>
               </a:spcAft>
               <a:buNone/>
             </a:pPr>
+            <a:endParaRPr lang="en-US" sz="3200" dirty="0">
+              <a:latin typeface="Verdana Regular" charset="0"/>
+            </a:endParaRPr>
+          </a:p>
+          <a:p>
+            <a:pPr marL="0" indent="0">
+              <a:spcAft>
+                <a:spcPts val="2600"/>
+              </a:spcAft>
+              <a:buNone/>
+            </a:pPr>
             <a:r>
               <a:rPr lang="en-US" sz="3200" dirty="0">
                 <a:latin typeface="Verdana Regular" charset="0"/>
               </a:rPr>
-              <a:t>Hardware Used: Arduino Nano, Raspberry Pi Zero W, WS2812 </a:t>
-            </a:r>
-            <a:r>
-              <a:rPr lang="en-US" sz="3200" dirty="0" err="1">
+              <a:t>Hardware Used:</a:t>
+            </a:r>
+          </a:p>
+          <a:p>
+            <a:pPr>
+              <a:spcAft>
+                <a:spcPts val="2600"/>
+              </a:spcAft>
+            </a:pPr>
+            <a:r>
+              <a:rPr lang="en-US" sz="3200" dirty="0">
+                <a:latin typeface="Verdana Regular" charset="0"/>
+              </a:rPr>
+              <a:t>Arduino Nano</a:t>
+            </a:r>
+            <a:endParaRPr lang="en-US" sz="3200" i="1" dirty="0">
+              <a:latin typeface="Verdana Regular" charset="0"/>
+            </a:endParaRPr>
+          </a:p>
+          <a:p>
+            <a:pPr>
+              <a:spcAft>
+                <a:spcPts val="2600"/>
+              </a:spcAft>
+            </a:pPr>
+            <a:r>
+              <a:rPr lang="en-US" sz="3200" dirty="0">
+                <a:latin typeface="Verdana Regular" charset="0"/>
+              </a:rPr>
+              <a:t>Raspberry Pi Zero W</a:t>
+            </a:r>
+          </a:p>
+          <a:p>
+            <a:pPr>
+              <a:spcAft>
+                <a:spcPts val="2600"/>
+              </a:spcAft>
+            </a:pPr>
+            <a:r>
+              <a:rPr lang="en-US" sz="3200" dirty="0">
+                <a:latin typeface="Verdana Regular" charset="0"/>
+              </a:rPr>
+              <a:t>WS2812 </a:t>
+            </a:r>
+            <a:r>
+              <a:rPr lang="en-US" sz="3200">
                 <a:latin typeface="Verdana Regular" charset="0"/>
               </a:rPr>
               <a:t>Neopixel</a:t>
@@ -3814,7 +3867,7 @@
               <a:rPr lang="en-US" sz="3200" dirty="0">
                 <a:latin typeface="Verdana Regular" charset="0"/>
               </a:rPr>
-              <a:t> LEDS. </a:t>
+              <a:t> LEDs </a:t>
             </a:r>
           </a:p>
         </p:txBody>

</xml_diff>

<commit_message>
Added team descriptions rough
</commit_message>
<xml_diff>
--- a/Documents/ExpoPoster/poster_undergrad_expo_48x36_eecs.pptx
+++ b/Documents/ExpoPoster/poster_undergrad_expo_48x36_eecs.pptx
@@ -156,6 +156,10 @@
 </p:presentation>
 </file>
 
+<file path=ppt/revisionInfo.xml><?xml version="1.0" encoding="utf-8"?>
+<p1510:revInfo xmlns:a="http://schemas.openxmlformats.org/drawingml/2006/main" xmlns:r="http://schemas.openxmlformats.org/officeDocument/2006/relationships" xmlns:p1510="http://schemas.microsoft.com/office/powerpoint/2015/10/main"/>
+</file>
+
 <file path=ppt/notesMasters/notesMaster1.xml><?xml version="1.0" encoding="utf-8"?>
 <p:notesMaster xmlns:a="http://schemas.openxmlformats.org/drawingml/2006/main" xmlns:r="http://schemas.openxmlformats.org/officeDocument/2006/relationships" xmlns:p="http://schemas.openxmlformats.org/presentationml/2006/main">
   <p:cSld>
@@ -243,7 +247,7 @@
             <a:fld id="{9CF59EBC-EC05-6B4D-B166-DDFA6A1EDCB6}" type="datetimeFigureOut">
               <a:rPr lang="en-US" smtClean="0"/>
               <a:pPr/>
-              <a:t>4/17/2018</a:t>
+              <a:t>4/21/2018</a:t>
             </a:fld>
             <a:endParaRPr lang="en-US" dirty="0"/>
           </a:p>
@@ -2087,7 +2091,7 @@
         <p:spPr>
           <a:xfrm>
             <a:off x="1432350" y="17199051"/>
-            <a:ext cx="9418320" cy="4821833"/>
+            <a:ext cx="9418320" cy="8227893"/>
           </a:xfrm>
           <a:prstGeom prst="rect">
             <a:avLst/>
@@ -2267,91 +2271,187 @@
           </a:lstStyle>
           <a:p>
             <a:pPr>
+              <a:lnSpc>
+                <a:spcPct val="100000"/>
+              </a:lnSpc>
               <a:spcAft>
                 <a:spcPts val="2600"/>
               </a:spcAft>
             </a:pPr>
             <a:r>
+              <a:rPr lang="en-US" sz="3200" b="1" dirty="0">
+                <a:solidFill>
+                  <a:schemeClr val="bg1"/>
+                </a:solidFill>
+                <a:latin typeface="Verdana Regular" charset="0"/>
+              </a:rPr>
+              <a:t>Victor Hsu</a:t>
+            </a:r>
+            <a:r>
               <a:rPr lang="en-US" sz="3200" dirty="0">
                 <a:solidFill>
                   <a:schemeClr val="bg1"/>
                 </a:solidFill>
                 <a:latin typeface="Verdana Regular" charset="0"/>
               </a:rPr>
-              <a:t>Victor Hsu: Project sponsor. Provided us with hardware. Lover of fresh herbs, and spices. hsuv@oregonstate.edu</a:t>
+              <a:t>: Project sponsor. Provided us with hardware. Loves fresh herbs and spices. hsuv@oregonstate.edu</a:t>
             </a:r>
           </a:p>
           <a:p>
             <a:pPr>
+              <a:lnSpc>
+                <a:spcPct val="100000"/>
+              </a:lnSpc>
               <a:spcAft>
                 <a:spcPts val="2600"/>
               </a:spcAft>
             </a:pPr>
             <a:r>
+              <a:rPr lang="en-US" sz="3200" b="1" dirty="0">
+                <a:solidFill>
+                  <a:schemeClr val="bg1"/>
+                </a:solidFill>
+                <a:latin typeface="Verdana Regular" charset="0"/>
+              </a:rPr>
+              <a:t>Austin </a:t>
+            </a:r>
+            <a:r>
+              <a:rPr lang="en-US" sz="3200" b="1" dirty="0" err="1">
+                <a:solidFill>
+                  <a:schemeClr val="bg1"/>
+                </a:solidFill>
+                <a:latin typeface="Verdana Regular" charset="0"/>
+              </a:rPr>
+              <a:t>Hodgin</a:t>
+            </a:r>
+            <a:r>
               <a:rPr lang="en-US" sz="3200" dirty="0">
                 <a:solidFill>
                   <a:schemeClr val="bg1"/>
                 </a:solidFill>
                 <a:latin typeface="Verdana Regular" charset="0"/>
               </a:rPr>
-              <a:t>Austin Hodgin: austin.hodgin@oregonstate.edu</a:t>
+              <a:t>: Expo Captain. CLI, Site.  austin.hodgin@oregonstate.edu</a:t>
             </a:r>
           </a:p>
           <a:p>
             <a:pPr>
+              <a:lnSpc>
+                <a:spcPct val="100000"/>
+              </a:lnSpc>
               <a:spcAft>
                 <a:spcPts val="2600"/>
               </a:spcAft>
             </a:pPr>
             <a:r>
+              <a:rPr lang="en-US" sz="3200" b="1" dirty="0">
+                <a:solidFill>
+                  <a:schemeClr val="bg1"/>
+                </a:solidFill>
+                <a:latin typeface="Verdana Regular" charset="0"/>
+              </a:rPr>
+              <a:t>Travis </a:t>
+            </a:r>
+            <a:r>
+              <a:rPr lang="en-US" sz="3200" b="1" dirty="0" err="1">
+                <a:solidFill>
+                  <a:schemeClr val="bg1"/>
+                </a:solidFill>
+                <a:latin typeface="Verdana Regular" charset="0"/>
+              </a:rPr>
+              <a:t>Hodgin</a:t>
+            </a:r>
+            <a:r>
               <a:rPr lang="en-US" sz="3200" dirty="0">
                 <a:solidFill>
                   <a:schemeClr val="bg1"/>
                 </a:solidFill>
                 <a:latin typeface="Verdana Regular" charset="0"/>
               </a:rPr>
-              <a:t>Travis Hodgin: hodgint@oregonstate.edu</a:t>
+              <a:t>: </a:t>
+            </a:r>
+            <a:r>
+              <a:rPr lang="en-US" sz="3200" dirty="0" err="1">
+                <a:solidFill>
+                  <a:schemeClr val="bg1"/>
+                </a:solidFill>
+                <a:latin typeface="Verdana Regular" charset="0"/>
+              </a:rPr>
+              <a:t>WebDev</a:t>
+            </a:r>
+            <a:r>
+              <a:rPr lang="en-US" sz="3200" dirty="0">
+                <a:solidFill>
+                  <a:schemeClr val="bg1"/>
+                </a:solidFill>
+                <a:latin typeface="Verdana Regular" charset="0"/>
+              </a:rPr>
+              <a:t> Hero. Website, LED controller firmware. hodgint@oregonstate.edu</a:t>
             </a:r>
           </a:p>
           <a:p>
             <a:pPr>
+              <a:lnSpc>
+                <a:spcPct val="100000"/>
+              </a:lnSpc>
               <a:spcAft>
                 <a:spcPts val="2600"/>
               </a:spcAft>
             </a:pPr>
             <a:r>
+              <a:rPr lang="en-US" sz="3200" b="1" dirty="0">
+                <a:solidFill>
+                  <a:schemeClr val="bg1"/>
+                </a:solidFill>
+                <a:latin typeface="Verdana Regular" charset="0"/>
+              </a:rPr>
+              <a:t>Max Schmidt</a:t>
+            </a:r>
+            <a:r>
               <a:rPr lang="en-US" sz="3200" dirty="0">
                 <a:solidFill>
                   <a:schemeClr val="bg1"/>
                 </a:solidFill>
                 <a:latin typeface="Verdana Regular" charset="0"/>
               </a:rPr>
-              <a:t>Max Schmidt: schmidtm@oregonstate.edu</a:t>
+              <a:t>: Hardware Guru. State composer, power system. schmidtm@oregonstate.edu</a:t>
             </a:r>
           </a:p>
           <a:p>
             <a:pPr>
+              <a:lnSpc>
+                <a:spcPct val="100000"/>
+              </a:lnSpc>
               <a:spcAft>
                 <a:spcPts val="2600"/>
               </a:spcAft>
             </a:pPr>
             <a:r>
+              <a:rPr lang="en-US" sz="3200" b="1" dirty="0">
+                <a:solidFill>
+                  <a:schemeClr val="bg1"/>
+                </a:solidFill>
+                <a:latin typeface="Verdana Regular" charset="0"/>
+              </a:rPr>
+              <a:t>Zach Lerew</a:t>
+            </a:r>
+            <a:r>
               <a:rPr lang="en-US" sz="3200" dirty="0">
                 <a:solidFill>
                   <a:schemeClr val="bg1"/>
                 </a:solidFill>
                 <a:latin typeface="Verdana Regular" charset="0"/>
               </a:rPr>
-              <a:t>Zach </a:t>
-            </a:r>
-            <a:r>
-              <a:rPr lang="en-US" sz="3200" dirty="0" err="1">
+              <a:t>: Project lead. API, internal state</a:t>
+            </a:r>
+            <a:r>
+              <a:rPr lang="en-US" sz="3200">
                 <a:solidFill>
                   <a:schemeClr val="bg1"/>
                 </a:solidFill>
                 <a:latin typeface="Verdana Regular" charset="0"/>
               </a:rPr>
-              <a:t>Lerew</a:t>
+              <a:t>, database </a:t>
             </a:r>
             <a:r>
               <a:rPr lang="en-US" sz="3200" dirty="0">
@@ -2360,7 +2460,7 @@
                 </a:solidFill>
                 <a:latin typeface="Verdana Regular" charset="0"/>
               </a:rPr>
-              <a:t>: lerewz@oregonstate.edu</a:t>
+              <a:t>management system. lerewz@oregonstate.edu</a:t>
             </a:r>
           </a:p>
         </p:txBody>

</xml_diff>